<commit_message>
aking this branch the same as the lab_repo
</commit_message>
<xml_diff>
--- a/Week02-04/M1_slides/Lab2_2.pptx
+++ b/Week02-04/M1_slides/Lab2_2.pptx
@@ -284,7 +284,7 @@
           <a:p>
             <a:fld id="{1205BC88-DBF0-4610-A802-A09E0A6ECD22}" type="datetimeFigureOut">
               <a:rPr lang="en-AU" smtClean="0"/>
-              <a:t>4/08/2025</a:t>
+              <a:t>17/08/2025</a:t>
             </a:fld>
             <a:endParaRPr lang="en-AU"/>
           </a:p>
@@ -512,7 +512,7 @@
           <a:p>
             <a:fld id="{1205BC88-DBF0-4610-A802-A09E0A6ECD22}" type="datetimeFigureOut">
               <a:rPr lang="en-AU" smtClean="0"/>
-              <a:t>4/08/2025</a:t>
+              <a:t>17/08/2025</a:t>
             </a:fld>
             <a:endParaRPr lang="en-AU"/>
           </a:p>
@@ -692,7 +692,7 @@
           <a:p>
             <a:fld id="{1205BC88-DBF0-4610-A802-A09E0A6ECD22}" type="datetimeFigureOut">
               <a:rPr lang="en-AU" smtClean="0"/>
-              <a:t>4/08/2025</a:t>
+              <a:t>17/08/2025</a:t>
             </a:fld>
             <a:endParaRPr lang="en-AU"/>
           </a:p>
@@ -862,7 +862,7 @@
           <a:p>
             <a:fld id="{1205BC88-DBF0-4610-A802-A09E0A6ECD22}" type="datetimeFigureOut">
               <a:rPr lang="en-AU" smtClean="0"/>
-              <a:t>4/08/2025</a:t>
+              <a:t>17/08/2025</a:t>
             </a:fld>
             <a:endParaRPr lang="en-AU"/>
           </a:p>
@@ -1116,7 +1116,7 @@
           <a:p>
             <a:fld id="{1205BC88-DBF0-4610-A802-A09E0A6ECD22}" type="datetimeFigureOut">
               <a:rPr lang="en-AU" smtClean="0"/>
-              <a:t>4/08/2025</a:t>
+              <a:t>17/08/2025</a:t>
             </a:fld>
             <a:endParaRPr lang="en-AU"/>
           </a:p>
@@ -1442,7 +1442,7 @@
           <a:p>
             <a:fld id="{1205BC88-DBF0-4610-A802-A09E0A6ECD22}" type="datetimeFigureOut">
               <a:rPr lang="en-AU" smtClean="0"/>
-              <a:t>4/08/2025</a:t>
+              <a:t>17/08/2025</a:t>
             </a:fld>
             <a:endParaRPr lang="en-AU"/>
           </a:p>
@@ -1893,7 +1893,7 @@
           <a:p>
             <a:fld id="{1205BC88-DBF0-4610-A802-A09E0A6ECD22}" type="datetimeFigureOut">
               <a:rPr lang="en-AU" smtClean="0"/>
-              <a:t>4/08/2025</a:t>
+              <a:t>17/08/2025</a:t>
             </a:fld>
             <a:endParaRPr lang="en-AU"/>
           </a:p>
@@ -2011,7 +2011,7 @@
           <a:p>
             <a:fld id="{1205BC88-DBF0-4610-A802-A09E0A6ECD22}" type="datetimeFigureOut">
               <a:rPr lang="en-AU" smtClean="0"/>
-              <a:t>4/08/2025</a:t>
+              <a:t>17/08/2025</a:t>
             </a:fld>
             <a:endParaRPr lang="en-AU"/>
           </a:p>
@@ -2106,7 +2106,7 @@
           <a:p>
             <a:fld id="{1205BC88-DBF0-4610-A802-A09E0A6ECD22}" type="datetimeFigureOut">
               <a:rPr lang="en-AU" smtClean="0"/>
-              <a:t>4/08/2025</a:t>
+              <a:t>17/08/2025</a:t>
             </a:fld>
             <a:endParaRPr lang="en-AU"/>
           </a:p>
@@ -2393,7 +2393,7 @@
           <a:p>
             <a:fld id="{1205BC88-DBF0-4610-A802-A09E0A6ECD22}" type="datetimeFigureOut">
               <a:rPr lang="en-AU" smtClean="0"/>
-              <a:t>4/08/2025</a:t>
+              <a:t>17/08/2025</a:t>
             </a:fld>
             <a:endParaRPr lang="en-AU"/>
           </a:p>
@@ -2715,7 +2715,7 @@
           <a:p>
             <a:fld id="{1205BC88-DBF0-4610-A802-A09E0A6ECD22}" type="datetimeFigureOut">
               <a:rPr lang="en-AU" smtClean="0"/>
-              <a:t>4/08/2025</a:t>
+              <a:t>17/08/2025</a:t>
             </a:fld>
             <a:endParaRPr lang="en-AU"/>
           </a:p>
@@ -2969,7 +2969,7 @@
           <a:p>
             <a:fld id="{1205BC88-DBF0-4610-A802-A09E0A6ECD22}" type="datetimeFigureOut">
               <a:rPr lang="en-AU" smtClean="0"/>
-              <a:t>4/08/2025</a:t>
+              <a:t>17/08/2025</a:t>
             </a:fld>
             <a:endParaRPr lang="en-AU"/>
           </a:p>
@@ -6562,7 +6562,7 @@
             </a:r>
             <a:r>
               <a:rPr lang="en-AU" sz="2000" i="1" dirty="0" err="1"/>
-              <a:t>self.set_state_vector</a:t>
+              <a:t>self.robot.drive</a:t>
             </a:r>
             <a:r>
               <a:rPr lang="en-AU" sz="2000" i="1" dirty="0"/>
@@ -6570,7 +6570,19 @@
             </a:r>
             <a:r>
               <a:rPr lang="en-AU" sz="2000" dirty="0"/>
-              <a:t>function inside </a:t>
+              <a:t>and </a:t>
+            </a:r>
+            <a:r>
+              <a:rPr lang="en-AU" sz="2000" i="1" dirty="0" err="1"/>
+              <a:t>self.set_state_vector</a:t>
+            </a:r>
+            <a:r>
+              <a:rPr lang="en-AU" sz="2000" i="1" dirty="0"/>
+              <a:t> </a:t>
+            </a:r>
+            <a:r>
+              <a:rPr lang="en-AU" sz="2000" dirty="0"/>
+              <a:t>functions inside </a:t>
             </a:r>
             <a:r>
               <a:rPr lang="en-AU" sz="2000" i="1" dirty="0"/>
@@ -6578,7 +6590,15 @@
             </a:r>
             <a:r>
               <a:rPr lang="en-AU" sz="2000" dirty="0"/>
-              <a:t>to update the state estimate</a:t>
+              <a:t>to update the robot (Predict) and state </a:t>
+            </a:r>
+            <a:r>
+              <a:rPr lang="en-AU" sz="2000"/>
+              <a:t>(Update) estimates </a:t>
+            </a:r>
+            <a:r>
+              <a:rPr lang="en-AU" sz="2000" dirty="0"/>
+              <a:t>respectively</a:t>
             </a:r>
           </a:p>
           <a:p>
@@ -6587,15 +6607,7 @@
           <a:p>
             <a:r>
               <a:rPr lang="en-AU" sz="2000" dirty="0"/>
-              <a:t>You can create your own arena by crafting your own marker blocks (see </a:t>
-            </a:r>
-            <a:r>
-              <a:rPr lang="en-AU" sz="2000"/>
-              <a:t>“Week02-04 </a:t>
-            </a:r>
-            <a:r>
-              <a:rPr lang="en-AU" sz="2000" dirty="0"/>
-              <a:t>/</a:t>
+              <a:t>You can create your own arena by crafting your own marker blocks (see “Week02-04 /</a:t>
             </a:r>
             <a:r>
               <a:rPr lang="en-AU" sz="2000" dirty="0" err="1"/>

</xml_diff>